<commit_message>
Update to fix problem with GitHub
</commit_message>
<xml_diff>
--- a/ppt/SplunkFundamentals2v1_2.pptx
+++ b/ppt/SplunkFundamentals2v1_2.pptx
@@ -5,10 +5,10 @@
     <p:sldMasterId id="2147483660" r:id="rId4"/>
   </p:sldMasterIdLst>
   <p:notesMasterIdLst>
-    <p:notesMasterId r:id="rId100"/>
+    <p:notesMasterId r:id="rId104"/>
   </p:notesMasterIdLst>
   <p:handoutMasterIdLst>
-    <p:handoutMasterId r:id="rId101"/>
+    <p:handoutMasterId r:id="rId105"/>
   </p:handoutMasterIdLst>
   <p:sldIdLst>
     <p:sldId id="323" r:id="rId5"/>
@@ -105,7 +105,11 @@
     <p:sldId id="429" r:id="rId96"/>
     <p:sldId id="430" r:id="rId97"/>
     <p:sldId id="426" r:id="rId98"/>
-    <p:sldId id="340" r:id="rId99"/>
+    <p:sldId id="432" r:id="rId99"/>
+    <p:sldId id="433" r:id="rId100"/>
+    <p:sldId id="434" r:id="rId101"/>
+    <p:sldId id="435" r:id="rId102"/>
+    <p:sldId id="340" r:id="rId103"/>
   </p:sldIdLst>
   <p:sldSz cx="12192000" cy="6858000"/>
   <p:notesSz cx="9309100" cy="7053263"/>
@@ -359,6 +363,14 @@
             <p14:sldId id="426"/>
           </p14:sldIdLst>
         </p14:section>
+        <p14:section name="Appendix: Advanced Techniques" id="{860CF1E5-9751-4499-8A37-8347B142DB06}">
+          <p14:sldIdLst>
+            <p14:sldId id="432"/>
+            <p14:sldId id="433"/>
+            <p14:sldId id="434"/>
+            <p14:sldId id="435"/>
+          </p14:sldIdLst>
+        </p14:section>
         <p14:section name="Conclusion" id="{437119FA-B2B2-43B2-BA16-8275F50D5A56}">
           <p14:sldIdLst>
             <p14:sldId id="340"/>
@@ -520,7 +532,7 @@
               <a:pPr>
                 <a:defRPr/>
               </a:pPr>
-              <a:t>12/19/2019</a:t>
+              <a:t>1/21/2020</a:t>
             </a:fld>
             <a:endParaRPr lang="en-US"/>
           </a:p>
@@ -739,7 +751,7 @@
               <a:pPr>
                 <a:defRPr/>
               </a:pPr>
-              <a:t>12/19/2019</a:t>
+              <a:t>1/21/2020</a:t>
             </a:fld>
             <a:endParaRPr lang="en-US"/>
           </a:p>
@@ -2078,7 +2090,7 @@
           <a:p>
             <a:fld id="{4BDF68E2-58F2-4D09-BE8B-E3BD06533059}" type="datetimeFigureOut">
               <a:rPr lang="en-US" dirty="0"/>
-              <a:t>12/19/2019</a:t>
+              <a:t>1/21/2020</a:t>
             </a:fld>
             <a:endParaRPr lang="en-US" dirty="0"/>
           </a:p>
@@ -3273,7 +3285,7 @@
           <a:p>
             <a:fld id="{528FC5F6-F338-4AE4-BB23-26385BCFC423}" type="datetimeFigureOut">
               <a:rPr lang="en-US" dirty="0"/>
-              <a:t>12/19/2019</a:t>
+              <a:t>1/21/2020</a:t>
             </a:fld>
             <a:endParaRPr lang="en-US" dirty="0"/>
           </a:p>
@@ -9742,15 +9754,7 @@
           <a:p>
             <a:r>
               <a:rPr lang="en-US" dirty="0" smtClean="0"/>
-              <a:t>Duration: </a:t>
-            </a:r>
-            <a:r>
-              <a:rPr lang="en-US" dirty="0" smtClean="0"/>
-              <a:t>75 </a:t>
-            </a:r>
-            <a:r>
-              <a:rPr lang="en-US" dirty="0" smtClean="0"/>
-              <a:t>minutes</a:t>
+              <a:t>Duration: 75 minutes</a:t>
             </a:r>
             <a:endParaRPr lang="en-US" dirty="0"/>
           </a:p>
@@ -12683,15 +12687,7 @@
           <a:p>
             <a:r>
               <a:rPr lang="en-US" dirty="0" smtClean="0"/>
-              <a:t>Duration: </a:t>
-            </a:r>
-            <a:r>
-              <a:rPr lang="en-US" dirty="0" smtClean="0"/>
-              <a:t>75 </a:t>
-            </a:r>
-            <a:r>
-              <a:rPr lang="en-US" dirty="0" smtClean="0"/>
-              <a:t>minutes</a:t>
+              <a:t>Duration: 75 minutes</a:t>
             </a:r>
             <a:endParaRPr lang="en-US" dirty="0"/>
           </a:p>
@@ -12924,15 +12920,7 @@
           <a:p>
             <a:r>
               <a:rPr lang="en-US" dirty="0" smtClean="0"/>
-              <a:t>In the pipeline adds </a:t>
-            </a:r>
-            <a:r>
-              <a:rPr lang="en-US" dirty="0" smtClean="0"/>
-              <a:t>an inline </a:t>
-            </a:r>
-            <a:r>
-              <a:rPr lang="en-US" dirty="0" smtClean="0"/>
-              <a:t>filter, streaming</a:t>
+              <a:t>In the pipeline adds an inline filter, streaming</a:t>
             </a:r>
           </a:p>
           <a:p>
@@ -12941,7 +12929,6 @@
               <a:rPr lang="en-US" dirty="0" smtClean="0"/>
               <a:t>Allows for inline SPL semantics</a:t>
             </a:r>
-            <a:endParaRPr lang="en-US" dirty="0" smtClean="0"/>
           </a:p>
         </p:txBody>
       </p:sp>
@@ -13258,11 +13245,7 @@
           <a:p>
             <a:r>
               <a:rPr lang="en-US" dirty="0" smtClean="0"/>
-              <a:t>Another way of adding an inline </a:t>
-            </a:r>
-            <a:r>
-              <a:rPr lang="en-US" dirty="0" smtClean="0"/>
-              <a:t>filter</a:t>
+              <a:t>Another way of adding an inline filter</a:t>
             </a:r>
           </a:p>
           <a:p>
@@ -13276,7 +13259,6 @@
               <a:rPr lang="en-US" dirty="0" smtClean="0"/>
               <a:t>Case-sensitive</a:t>
             </a:r>
-            <a:endParaRPr lang="en-US" dirty="0" smtClean="0"/>
           </a:p>
         </p:txBody>
       </p:sp>
@@ -18450,7 +18432,6 @@
               <a:rPr lang="en-US" sz="1400" dirty="0"/>
               <a:t> In this lab you create an index that is populated by a scheduled job, which runs every hour. This means that no significant results will be observable at the end of the lab, as the job will not have had time to run yet.</a:t>
             </a:r>
-            <a:endParaRPr lang="en-US" sz="1400" dirty="0"/>
           </a:p>
           <a:p>
             <a:r>
@@ -18508,6 +18489,283 @@
 </file>
 
 <file path=ppt/slides/slide95.xml><?xml version="1.0" encoding="utf-8"?>
+<p:sld xmlns:a="http://schemas.openxmlformats.org/drawingml/2006/main" xmlns:r="http://schemas.openxmlformats.org/officeDocument/2006/relationships" xmlns:p="http://schemas.openxmlformats.org/presentationml/2006/main">
+  <p:cSld>
+    <p:spTree>
+      <p:nvGrpSpPr>
+        <p:cNvPr id="1" name=""/>
+        <p:cNvGrpSpPr/>
+        <p:nvPr/>
+      </p:nvGrpSpPr>
+      <p:grpSpPr>
+        <a:xfrm>
+          <a:off x="0" y="0"/>
+          <a:ext cx="0" cy="0"/>
+          <a:chOff x="0" y="0"/>
+          <a:chExt cx="0" cy="0"/>
+        </a:xfrm>
+      </p:grpSpPr>
+      <p:sp>
+        <p:nvSpPr>
+          <p:cNvPr id="2" name="Title 1"/>
+          <p:cNvSpPr>
+            <a:spLocks noGrp="1"/>
+          </p:cNvSpPr>
+          <p:nvPr>
+            <p:ph type="title"/>
+          </p:nvPr>
+        </p:nvSpPr>
+        <p:spPr/>
+        <p:txBody>
+          <a:bodyPr/>
+          <a:lstStyle/>
+          <a:p>
+            <a:r>
+              <a:rPr lang="en-US" dirty="0" smtClean="0"/>
+              <a:t>Appendix: Customization</a:t>
+            </a:r>
+            <a:endParaRPr lang="en-US" dirty="0"/>
+          </a:p>
+        </p:txBody>
+      </p:sp>
+    </p:spTree>
+    <p:extLst>
+      <p:ext uri="{BB962C8B-B14F-4D97-AF65-F5344CB8AC3E}">
+        <p14:creationId xmlns:p14="http://schemas.microsoft.com/office/powerpoint/2010/main" val="880001071"/>
+      </p:ext>
+    </p:extLst>
+  </p:cSld>
+  <p:clrMapOvr>
+    <a:masterClrMapping/>
+  </p:clrMapOvr>
+</p:sld>
+</file>
+
+<file path=ppt/slides/slide96.xml><?xml version="1.0" encoding="utf-8"?>
+<p:sld xmlns:a="http://schemas.openxmlformats.org/drawingml/2006/main" xmlns:r="http://schemas.openxmlformats.org/officeDocument/2006/relationships" xmlns:p="http://schemas.openxmlformats.org/presentationml/2006/main">
+  <p:cSld>
+    <p:spTree>
+      <p:nvGrpSpPr>
+        <p:cNvPr id="1" name=""/>
+        <p:cNvGrpSpPr/>
+        <p:nvPr/>
+      </p:nvGrpSpPr>
+      <p:grpSpPr>
+        <a:xfrm>
+          <a:off x="0" y="0"/>
+          <a:ext cx="0" cy="0"/>
+          <a:chOff x="0" y="0"/>
+          <a:chExt cx="0" cy="0"/>
+        </a:xfrm>
+      </p:grpSpPr>
+      <p:sp>
+        <p:nvSpPr>
+          <p:cNvPr id="3" name="Title 2"/>
+          <p:cNvSpPr>
+            <a:spLocks noGrp="1"/>
+          </p:cNvSpPr>
+          <p:nvPr>
+            <p:ph type="title"/>
+          </p:nvPr>
+        </p:nvSpPr>
+        <p:spPr/>
+        <p:txBody>
+          <a:bodyPr/>
+          <a:lstStyle/>
+          <a:p>
+            <a:r>
+              <a:rPr lang="en-US" dirty="0" smtClean="0"/>
+              <a:t>Customizing the application navigation</a:t>
+            </a:r>
+            <a:endParaRPr lang="en-US" dirty="0"/>
+          </a:p>
+        </p:txBody>
+      </p:sp>
+      <p:sp>
+        <p:nvSpPr>
+          <p:cNvPr id="4" name="Text Placeholder 3"/>
+          <p:cNvSpPr>
+            <a:spLocks noGrp="1"/>
+          </p:cNvSpPr>
+          <p:nvPr>
+            <p:ph type="body" sz="quarter" idx="10"/>
+          </p:nvPr>
+        </p:nvSpPr>
+        <p:spPr/>
+        <p:txBody>
+          <a:bodyPr/>
+          <a:lstStyle/>
+          <a:p>
+            <a:endParaRPr lang="en-US"/>
+          </a:p>
+        </p:txBody>
+      </p:sp>
+    </p:spTree>
+    <p:extLst>
+      <p:ext uri="{BB962C8B-B14F-4D97-AF65-F5344CB8AC3E}">
+        <p14:creationId xmlns:p14="http://schemas.microsoft.com/office/powerpoint/2010/main" val="3341250038"/>
+      </p:ext>
+    </p:extLst>
+  </p:cSld>
+  <p:clrMapOvr>
+    <a:masterClrMapping/>
+  </p:clrMapOvr>
+</p:sld>
+</file>
+
+<file path=ppt/slides/slide97.xml><?xml version="1.0" encoding="utf-8"?>
+<p:sld xmlns:a="http://schemas.openxmlformats.org/drawingml/2006/main" xmlns:r="http://schemas.openxmlformats.org/officeDocument/2006/relationships" xmlns:p="http://schemas.openxmlformats.org/presentationml/2006/main">
+  <p:cSld>
+    <p:spTree>
+      <p:nvGrpSpPr>
+        <p:cNvPr id="1" name=""/>
+        <p:cNvGrpSpPr/>
+        <p:nvPr/>
+      </p:nvGrpSpPr>
+      <p:grpSpPr>
+        <a:xfrm>
+          <a:off x="0" y="0"/>
+          <a:ext cx="0" cy="0"/>
+          <a:chOff x="0" y="0"/>
+          <a:chExt cx="0" cy="0"/>
+        </a:xfrm>
+      </p:grpSpPr>
+      <p:sp>
+        <p:nvSpPr>
+          <p:cNvPr id="2" name="Title 1"/>
+          <p:cNvSpPr>
+            <a:spLocks noGrp="1"/>
+          </p:cNvSpPr>
+          <p:nvPr>
+            <p:ph type="title"/>
+          </p:nvPr>
+        </p:nvSpPr>
+        <p:spPr/>
+        <p:txBody>
+          <a:bodyPr/>
+          <a:lstStyle/>
+          <a:p>
+            <a:r>
+              <a:rPr lang="en-US" dirty="0" smtClean="0"/>
+              <a:t>Custom visuals</a:t>
+            </a:r>
+            <a:endParaRPr lang="en-US" dirty="0"/>
+          </a:p>
+        </p:txBody>
+      </p:sp>
+      <p:sp>
+        <p:nvSpPr>
+          <p:cNvPr id="3" name="Text Placeholder 2"/>
+          <p:cNvSpPr>
+            <a:spLocks noGrp="1"/>
+          </p:cNvSpPr>
+          <p:nvPr>
+            <p:ph type="body" sz="quarter" idx="10"/>
+          </p:nvPr>
+        </p:nvSpPr>
+        <p:spPr/>
+        <p:txBody>
+          <a:bodyPr/>
+          <a:lstStyle/>
+          <a:p>
+            <a:endParaRPr lang="en-US"/>
+          </a:p>
+        </p:txBody>
+      </p:sp>
+    </p:spTree>
+    <p:extLst>
+      <p:ext uri="{BB962C8B-B14F-4D97-AF65-F5344CB8AC3E}">
+        <p14:creationId xmlns:p14="http://schemas.microsoft.com/office/powerpoint/2010/main" val="72432952"/>
+      </p:ext>
+    </p:extLst>
+  </p:cSld>
+  <p:clrMapOvr>
+    <a:masterClrMapping/>
+  </p:clrMapOvr>
+</p:sld>
+</file>
+
+<file path=ppt/slides/slide98.xml><?xml version="1.0" encoding="utf-8"?>
+<p:sld xmlns:a="http://schemas.openxmlformats.org/drawingml/2006/main" xmlns:r="http://schemas.openxmlformats.org/officeDocument/2006/relationships" xmlns:p="http://schemas.openxmlformats.org/presentationml/2006/main">
+  <p:cSld>
+    <p:spTree>
+      <p:nvGrpSpPr>
+        <p:cNvPr id="1" name=""/>
+        <p:cNvGrpSpPr/>
+        <p:nvPr/>
+      </p:nvGrpSpPr>
+      <p:grpSpPr>
+        <a:xfrm>
+          <a:off x="0" y="0"/>
+          <a:ext cx="0" cy="0"/>
+          <a:chOff x="0" y="0"/>
+          <a:chExt cx="0" cy="0"/>
+        </a:xfrm>
+      </p:grpSpPr>
+      <p:sp>
+        <p:nvSpPr>
+          <p:cNvPr id="2" name="Title 1"/>
+          <p:cNvSpPr>
+            <a:spLocks noGrp="1"/>
+          </p:cNvSpPr>
+          <p:nvPr>
+            <p:ph type="title"/>
+          </p:nvPr>
+        </p:nvSpPr>
+        <p:spPr/>
+        <p:txBody>
+          <a:bodyPr/>
+          <a:lstStyle/>
+          <a:p>
+            <a:r>
+              <a:rPr lang="en-US" dirty="0" smtClean="0"/>
+              <a:t>Remotely querying </a:t>
+            </a:r>
+            <a:r>
+              <a:rPr lang="en-US" dirty="0" err="1" smtClean="0"/>
+              <a:t>Splunk’s</a:t>
+            </a:r>
+            <a:r>
+              <a:rPr lang="en-US" smtClean="0"/>
+              <a:t> REST API</a:t>
+            </a:r>
+            <a:endParaRPr lang="en-US"/>
+          </a:p>
+        </p:txBody>
+      </p:sp>
+      <p:sp>
+        <p:nvSpPr>
+          <p:cNvPr id="3" name="Text Placeholder 2"/>
+          <p:cNvSpPr>
+            <a:spLocks noGrp="1"/>
+          </p:cNvSpPr>
+          <p:nvPr>
+            <p:ph type="body" sz="quarter" idx="10"/>
+          </p:nvPr>
+        </p:nvSpPr>
+        <p:spPr/>
+        <p:txBody>
+          <a:bodyPr/>
+          <a:lstStyle/>
+          <a:p>
+            <a:endParaRPr lang="en-US"/>
+          </a:p>
+        </p:txBody>
+      </p:sp>
+    </p:spTree>
+    <p:extLst>
+      <p:ext uri="{BB962C8B-B14F-4D97-AF65-F5344CB8AC3E}">
+        <p14:creationId xmlns:p14="http://schemas.microsoft.com/office/powerpoint/2010/main" val="2025764666"/>
+      </p:ext>
+    </p:extLst>
+  </p:cSld>
+  <p:clrMapOvr>
+    <a:masterClrMapping/>
+  </p:clrMapOvr>
+</p:sld>
+</file>
+
+<file path=ppt/slides/slide99.xml><?xml version="1.0" encoding="utf-8"?>
 <p:sld xmlns:a="http://schemas.openxmlformats.org/drawingml/2006/main" xmlns:r="http://schemas.openxmlformats.org/officeDocument/2006/relationships" xmlns:p="http://schemas.openxmlformats.org/presentationml/2006/main">
   <p:cSld>
     <p:spTree>

</xml_diff>

<commit_message>
Adjustments to ppt and CURL demo
</commit_message>
<xml_diff>
--- a/ppt/SplunkFundamentals2v1_2.pptx
+++ b/ppt/SplunkFundamentals2v1_2.pptx
@@ -17960,6 +17960,37 @@
           </a:p>
         </p:txBody>
       </p:sp>
+      <p:pic>
+        <p:nvPicPr>
+          <p:cNvPr id="4" name="Picture 3">
+            <a:hlinkClick r:id="rId2" action="ppaction://hlinkfile"/>
+            <a:extLst>
+              <a:ext uri="{FF2B5EF4-FFF2-40B4-BE49-F238E27FC236}">
+                <a16:creationId xmlns:a16="http://schemas.microsoft.com/office/drawing/2014/main" id="{F828083B-E8B3-4248-8611-B52D7EC66816}"/>
+              </a:ext>
+            </a:extLst>
+          </p:cNvPr>
+          <p:cNvPicPr>
+            <a:picLocks noChangeAspect="1"/>
+          </p:cNvPicPr>
+          <p:nvPr/>
+        </p:nvPicPr>
+        <p:blipFill>
+          <a:blip r:embed="rId3"/>
+          <a:stretch>
+            <a:fillRect/>
+          </a:stretch>
+        </p:blipFill>
+        <p:spPr>
+          <a:xfrm>
+            <a:off x="762000" y="4638557"/>
+            <a:ext cx="10698068" cy="847843"/>
+          </a:xfrm>
+          <a:prstGeom prst="rect">
+            <a:avLst/>
+          </a:prstGeom>
+        </p:spPr>
+      </p:pic>
     </p:spTree>
     <p:extLst>
       <p:ext uri="{BB962C8B-B14F-4D97-AF65-F5344CB8AC3E}">

</xml_diff>